<commit_message>
updated slide about issues
</commit_message>
<xml_diff>
--- a/Building a Secure and Decentralized Messaging App.pptx
+++ b/Building a Secure and Decentralized Messaging App.pptx
@@ -216,7 +216,7 @@
           <a:p>
             <a:fld id="{E98A00EB-C97D-4201-9B42-B905506ED2FD}" type="datetimeFigureOut">
               <a:rPr lang="en-GB" smtClean="0"/>
-              <a:t>28/07/2023</a:t>
+              <a:t>30/07/2023</a:t>
             </a:fld>
             <a:endParaRPr lang="en-GB"/>
           </a:p>
@@ -697,7 +697,7 @@
           <a:p>
             <a:fld id="{A7448C68-81E6-44AF-B09C-C95A98C95F96}" type="datetimeFigureOut">
               <a:rPr lang="en-GB" smtClean="0"/>
-              <a:t>28/07/2023</a:t>
+              <a:t>30/07/2023</a:t>
             </a:fld>
             <a:endParaRPr lang="en-GB"/>
           </a:p>
@@ -988,7 +988,7 @@
           <a:p>
             <a:fld id="{A7448C68-81E6-44AF-B09C-C95A98C95F96}" type="datetimeFigureOut">
               <a:rPr lang="en-GB" smtClean="0"/>
-              <a:t>28/07/2023</a:t>
+              <a:t>30/07/2023</a:t>
             </a:fld>
             <a:endParaRPr lang="en-GB"/>
           </a:p>
@@ -1247,7 +1247,7 @@
           <a:p>
             <a:fld id="{A7448C68-81E6-44AF-B09C-C95A98C95F96}" type="datetimeFigureOut">
               <a:rPr lang="en-GB" smtClean="0"/>
-              <a:t>28/07/2023</a:t>
+              <a:t>30/07/2023</a:t>
             </a:fld>
             <a:endParaRPr lang="en-GB"/>
           </a:p>
@@ -1716,7 +1716,7 @@
           <a:p>
             <a:fld id="{A7448C68-81E6-44AF-B09C-C95A98C95F96}" type="datetimeFigureOut">
               <a:rPr lang="en-GB" smtClean="0"/>
-              <a:t>28/07/2023</a:t>
+              <a:t>30/07/2023</a:t>
             </a:fld>
             <a:endParaRPr lang="en-GB"/>
           </a:p>
@@ -1896,7 +1896,7 @@
           <a:p>
             <a:fld id="{A7448C68-81E6-44AF-B09C-C95A98C95F96}" type="datetimeFigureOut">
               <a:rPr lang="en-GB" smtClean="0"/>
-              <a:t>28/07/2023</a:t>
+              <a:t>30/07/2023</a:t>
             </a:fld>
             <a:endParaRPr lang="en-GB"/>
           </a:p>
@@ -2472,7 +2472,7 @@
           <a:p>
             <a:fld id="{A7448C68-81E6-44AF-B09C-C95A98C95F96}" type="datetimeFigureOut">
               <a:rPr lang="en-GB" smtClean="0"/>
-              <a:t>28/07/2023</a:t>
+              <a:t>30/07/2023</a:t>
             </a:fld>
             <a:endParaRPr lang="en-GB"/>
           </a:p>
@@ -2804,7 +2804,7 @@
           <a:p>
             <a:fld id="{A7448C68-81E6-44AF-B09C-C95A98C95F96}" type="datetimeFigureOut">
               <a:rPr lang="en-GB" smtClean="0"/>
-              <a:t>28/07/2023</a:t>
+              <a:t>30/07/2023</a:t>
             </a:fld>
             <a:endParaRPr lang="en-GB"/>
           </a:p>
@@ -2979,7 +2979,7 @@
           <a:p>
             <a:fld id="{A7448C68-81E6-44AF-B09C-C95A98C95F96}" type="datetimeFigureOut">
               <a:rPr lang="en-GB" smtClean="0"/>
-              <a:t>28/07/2023</a:t>
+              <a:t>30/07/2023</a:t>
             </a:fld>
             <a:endParaRPr lang="en-GB"/>
           </a:p>
@@ -3159,7 +3159,7 @@
           <a:p>
             <a:fld id="{A7448C68-81E6-44AF-B09C-C95A98C95F96}" type="datetimeFigureOut">
               <a:rPr lang="en-GB" smtClean="0"/>
-              <a:t>28/07/2023</a:t>
+              <a:t>30/07/2023</a:t>
             </a:fld>
             <a:endParaRPr lang="en-GB"/>
           </a:p>
@@ -3329,7 +3329,7 @@
           <a:p>
             <a:fld id="{A7448C68-81E6-44AF-B09C-C95A98C95F96}" type="datetimeFigureOut">
               <a:rPr lang="en-GB" smtClean="0"/>
-              <a:t>28/07/2023</a:t>
+              <a:t>30/07/2023</a:t>
             </a:fld>
             <a:endParaRPr lang="en-GB"/>
           </a:p>
@@ -3586,7 +3586,7 @@
           <a:p>
             <a:fld id="{A7448C68-81E6-44AF-B09C-C95A98C95F96}" type="datetimeFigureOut">
               <a:rPr lang="en-GB" smtClean="0"/>
-              <a:t>28/07/2023</a:t>
+              <a:t>30/07/2023</a:t>
             </a:fld>
             <a:endParaRPr lang="en-GB"/>
           </a:p>
@@ -3878,7 +3878,7 @@
           <a:p>
             <a:fld id="{A7448C68-81E6-44AF-B09C-C95A98C95F96}" type="datetimeFigureOut">
               <a:rPr lang="en-GB" smtClean="0"/>
-              <a:t>28/07/2023</a:t>
+              <a:t>30/07/2023</a:t>
             </a:fld>
             <a:endParaRPr lang="en-GB"/>
           </a:p>
@@ -4308,7 +4308,7 @@
           <a:p>
             <a:fld id="{A7448C68-81E6-44AF-B09C-C95A98C95F96}" type="datetimeFigureOut">
               <a:rPr lang="en-GB" smtClean="0"/>
-              <a:t>28/07/2023</a:t>
+              <a:t>30/07/2023</a:t>
             </a:fld>
             <a:endParaRPr lang="en-GB"/>
           </a:p>
@@ -4426,7 +4426,7 @@
           <a:p>
             <a:fld id="{A7448C68-81E6-44AF-B09C-C95A98C95F96}" type="datetimeFigureOut">
               <a:rPr lang="en-GB" smtClean="0"/>
-              <a:t>28/07/2023</a:t>
+              <a:t>30/07/2023</a:t>
             </a:fld>
             <a:endParaRPr lang="en-GB"/>
           </a:p>
@@ -4521,7 +4521,7 @@
           <a:p>
             <a:fld id="{A7448C68-81E6-44AF-B09C-C95A98C95F96}" type="datetimeFigureOut">
               <a:rPr lang="en-GB" smtClean="0"/>
-              <a:t>28/07/2023</a:t>
+              <a:t>30/07/2023</a:t>
             </a:fld>
             <a:endParaRPr lang="en-GB"/>
           </a:p>
@@ -4804,7 +4804,7 @@
           <a:p>
             <a:fld id="{A7448C68-81E6-44AF-B09C-C95A98C95F96}" type="datetimeFigureOut">
               <a:rPr lang="en-GB" smtClean="0"/>
-              <a:t>28/07/2023</a:t>
+              <a:t>30/07/2023</a:t>
             </a:fld>
             <a:endParaRPr lang="en-GB"/>
           </a:p>
@@ -5095,7 +5095,7 @@
           <a:p>
             <a:fld id="{A7448C68-81E6-44AF-B09C-C95A98C95F96}" type="datetimeFigureOut">
               <a:rPr lang="en-GB" smtClean="0"/>
-              <a:t>28/07/2023</a:t>
+              <a:t>30/07/2023</a:t>
             </a:fld>
             <a:endParaRPr lang="en-GB"/>
           </a:p>
@@ -5326,7 +5326,7 @@
           <a:p>
             <a:fld id="{A7448C68-81E6-44AF-B09C-C95A98C95F96}" type="datetimeFigureOut">
               <a:rPr lang="en-GB" smtClean="0"/>
-              <a:t>28/07/2023</a:t>
+              <a:t>30/07/2023</a:t>
             </a:fld>
             <a:endParaRPr lang="en-GB"/>
           </a:p>
@@ -7580,7 +7580,7 @@
         <p:spPr>
           <a:xfrm>
             <a:off x="592282" y="2329934"/>
-            <a:ext cx="8998527" cy="3046988"/>
+            <a:ext cx="8998527" cy="4185761"/>
           </a:xfrm>
           <a:prstGeom prst="rect">
             <a:avLst/>
@@ -7618,6 +7618,7 @@
               <a:rPr lang="en-GB" dirty="0"/>
               <a:t>Actually we can use as private public key encryption decryption, keys from your wallet, but I don’t find any extension wallet which provide access to private key or at least give functionality to decrypt message by your private key:</a:t>
             </a:r>
+            <a:endParaRPr lang="ru-RU" dirty="0"/>
           </a:p>
           <a:p>
             <a:pPr lvl="1"/>
@@ -7631,6 +7632,32 @@
             <a:r>
               <a:rPr lang="en-GB" sz="1400" dirty="0"/>
               <a:t>We can solve it by creating whole new system of identities with private public keys, so for that we must add sign functionality in our frontend in verify functionality in our chat contract, but it looks very unnecessary</a:t>
+            </a:r>
+            <a:endParaRPr lang="ru-RU" dirty="0"/>
+          </a:p>
+          <a:p>
+            <a:pPr marL="285750" indent="-285750">
+              <a:buFont typeface="Arial" panose="020B0604020202020204" pitchFamily="34" charset="0"/>
+              <a:buChar char="•"/>
+            </a:pPr>
+            <a:r>
+              <a:rPr lang="en-GB" dirty="0"/>
+              <a:t>State reading:</a:t>
+            </a:r>
+          </a:p>
+          <a:p>
+            <a:pPr lvl="1"/>
+            <a:r>
+              <a:rPr lang="en-GB" sz="1400" dirty="0"/>
+              <a:t>since Gear Protocol do not provide multiple functions for reading state, even if I need just read last message I still have to read full state, it really slows the messenger. Actually</a:t>
+            </a:r>
+            <a:r>
+              <a:rPr lang="ru-RU" sz="1400" dirty="0"/>
+              <a:t> </a:t>
+            </a:r>
+            <a:r>
+              <a:rPr lang="en-GB" sz="1400" dirty="0"/>
+              <a:t>this is such a problem that it is probably better to abandon the creation of complex real-time responsive applications</a:t>
             </a:r>
           </a:p>
         </p:txBody>

</xml_diff>